<commit_message>
Ajustes nos arquivos do repositório (3)
</commit_message>
<xml_diff>
--- a/slides-aulas/aplicacoes.pptx
+++ b/slides-aulas/aplicacoes.pptx
@@ -10,7 +10,7 @@
   <p:sldIdLst>
     <p:sldId id="304" r:id="rId2"/>
     <p:sldId id="305" r:id="rId3"/>
-    <p:sldId id="306" r:id="rId4"/>
+    <p:sldId id="307" r:id="rId4"/>
     <p:sldId id="297" r:id="rId5"/>
     <p:sldId id="298" r:id="rId6"/>
     <p:sldId id="299" r:id="rId7"/>
@@ -236,7 +236,7 @@
           <a:p>
             <a:fld id="{5BF1738E-ADED-4991-AA7C-867EED4BDCA5}" type="datetimeFigureOut">
               <a:rPr lang="en-US" smtClean="0"/>
-              <a:t>12-Jun-17</a:t>
+              <a:t>23-Nov-17</a:t>
             </a:fld>
             <a:endParaRPr lang="en-US"/>
           </a:p>
@@ -767,7 +767,7 @@
           <a:p>
             <a:fld id="{048A0415-D8FC-43B6-9E04-E61941C24720}" type="datetimeFigureOut">
               <a:rPr lang="en-US" smtClean="0"/>
-              <a:t>12-Jun-17</a:t>
+              <a:t>23-Nov-17</a:t>
             </a:fld>
             <a:endParaRPr lang="en-US"/>
           </a:p>
@@ -937,7 +937,7 @@
           <a:p>
             <a:fld id="{048A0415-D8FC-43B6-9E04-E61941C24720}" type="datetimeFigureOut">
               <a:rPr lang="en-US" smtClean="0"/>
-              <a:t>12-Jun-17</a:t>
+              <a:t>23-Nov-17</a:t>
             </a:fld>
             <a:endParaRPr lang="en-US"/>
           </a:p>
@@ -1117,7 +1117,7 @@
           <a:p>
             <a:fld id="{048A0415-D8FC-43B6-9E04-E61941C24720}" type="datetimeFigureOut">
               <a:rPr lang="en-US" smtClean="0"/>
-              <a:t>12-Jun-17</a:t>
+              <a:t>23-Nov-17</a:t>
             </a:fld>
             <a:endParaRPr lang="en-US"/>
           </a:p>
@@ -1287,7 +1287,7 @@
           <a:p>
             <a:fld id="{048A0415-D8FC-43B6-9E04-E61941C24720}" type="datetimeFigureOut">
               <a:rPr lang="en-US" smtClean="0"/>
-              <a:t>12-Jun-17</a:t>
+              <a:t>23-Nov-17</a:t>
             </a:fld>
             <a:endParaRPr lang="en-US"/>
           </a:p>
@@ -1533,7 +1533,7 @@
           <a:p>
             <a:fld id="{048A0415-D8FC-43B6-9E04-E61941C24720}" type="datetimeFigureOut">
               <a:rPr lang="en-US" smtClean="0"/>
-              <a:t>12-Jun-17</a:t>
+              <a:t>23-Nov-17</a:t>
             </a:fld>
             <a:endParaRPr lang="en-US"/>
           </a:p>
@@ -1821,7 +1821,7 @@
           <a:p>
             <a:fld id="{048A0415-D8FC-43B6-9E04-E61941C24720}" type="datetimeFigureOut">
               <a:rPr lang="en-US" smtClean="0"/>
-              <a:t>12-Jun-17</a:t>
+              <a:t>23-Nov-17</a:t>
             </a:fld>
             <a:endParaRPr lang="en-US"/>
           </a:p>
@@ -2243,7 +2243,7 @@
           <a:p>
             <a:fld id="{048A0415-D8FC-43B6-9E04-E61941C24720}" type="datetimeFigureOut">
               <a:rPr lang="en-US" smtClean="0"/>
-              <a:t>12-Jun-17</a:t>
+              <a:t>23-Nov-17</a:t>
             </a:fld>
             <a:endParaRPr lang="en-US"/>
           </a:p>
@@ -2361,7 +2361,7 @@
           <a:p>
             <a:fld id="{048A0415-D8FC-43B6-9E04-E61941C24720}" type="datetimeFigureOut">
               <a:rPr lang="en-US" smtClean="0"/>
-              <a:t>12-Jun-17</a:t>
+              <a:t>23-Nov-17</a:t>
             </a:fld>
             <a:endParaRPr lang="en-US"/>
           </a:p>
@@ -2456,7 +2456,7 @@
           <a:p>
             <a:fld id="{048A0415-D8FC-43B6-9E04-E61941C24720}" type="datetimeFigureOut">
               <a:rPr lang="en-US" smtClean="0"/>
-              <a:t>12-Jun-17</a:t>
+              <a:t>23-Nov-17</a:t>
             </a:fld>
             <a:endParaRPr lang="en-US"/>
           </a:p>
@@ -2733,7 +2733,7 @@
           <a:p>
             <a:fld id="{048A0415-D8FC-43B6-9E04-E61941C24720}" type="datetimeFigureOut">
               <a:rPr lang="en-US" smtClean="0"/>
-              <a:t>12-Jun-17</a:t>
+              <a:t>23-Nov-17</a:t>
             </a:fld>
             <a:endParaRPr lang="en-US"/>
           </a:p>
@@ -2986,7 +2986,7 @@
           <a:p>
             <a:fld id="{048A0415-D8FC-43B6-9E04-E61941C24720}" type="datetimeFigureOut">
               <a:rPr lang="en-US" smtClean="0"/>
-              <a:t>12-Jun-17</a:t>
+              <a:t>23-Nov-17</a:t>
             </a:fld>
             <a:endParaRPr lang="en-US"/>
           </a:p>
@@ -3199,7 +3199,7 @@
           <a:p>
             <a:fld id="{048A0415-D8FC-43B6-9E04-E61941C24720}" type="datetimeFigureOut">
               <a:rPr lang="en-US" smtClean="0"/>
-              <a:t>12-Jun-17</a:t>
+              <a:t>23-Nov-17</a:t>
             </a:fld>
             <a:endParaRPr lang="en-US"/>
           </a:p>
@@ -3686,7 +3686,12 @@
             <p:ph idx="1"/>
           </p:nvPr>
         </p:nvSpPr>
-        <p:spPr/>
+        <p:spPr>
+          <a:xfrm>
+            <a:off x="457200" y="1600200"/>
+            <a:ext cx="8839200" cy="4525963"/>
+          </a:xfrm>
+        </p:spPr>
         <p:txBody>
           <a:bodyPr/>
           <a:lstStyle/>
@@ -3717,19 +3722,27 @@
             </a:r>
             <a:r>
               <a:rPr lang="en-US" dirty="0" smtClean="0"/>
-              <a:t> no </a:t>
+              <a:t> </a:t>
+            </a:r>
+            <a:r>
+              <a:rPr lang="en-US" dirty="0" err="1" smtClean="0"/>
+              <a:t>em</a:t>
+            </a:r>
+            <a:r>
+              <a:rPr lang="en-US" dirty="0" smtClean="0"/>
+              <a:t> </a:t>
+            </a:r>
+            <a:r>
+              <a:rPr lang="en-US" dirty="0" err="1" smtClean="0"/>
+              <a:t>nosso</a:t>
+            </a:r>
+            <a:r>
+              <a:rPr lang="en-US" dirty="0" smtClean="0"/>
+              <a:t> </a:t>
             </a:r>
             <a:r>
               <a:rPr lang="en-US" dirty="0" err="1" smtClean="0"/>
               <a:t>repositório</a:t>
-            </a:r>
-            <a:r>
-              <a:rPr lang="en-US" dirty="0" smtClean="0"/>
-              <a:t> da </a:t>
-            </a:r>
-            <a:r>
-              <a:rPr lang="en-US" dirty="0" err="1" smtClean="0"/>
-              <a:t>disciplina</a:t>
             </a:r>
             <a:endParaRPr lang="en-US" dirty="0"/>
           </a:p>
@@ -11026,7 +11039,7 @@
       </p:grpSpPr>
       <p:sp>
         <p:nvSpPr>
-          <p:cNvPr id="2" name="Title 1"/>
+          <p:cNvPr id="2" name="Título 1"/>
           <p:cNvSpPr>
             <a:spLocks noGrp="1"/>
           </p:cNvSpPr>
@@ -11041,7 +11054,7 @@
           <a:p>
             <a:r>
               <a:rPr lang="en-US" dirty="0" err="1" smtClean="0"/>
-              <a:t>Vários</a:t>
+              <a:t>Três</a:t>
             </a:r>
             <a:r>
               <a:rPr lang="en-US" dirty="0" smtClean="0"/>
@@ -11049,23 +11062,15 @@
             </a:r>
             <a:r>
               <a:rPr lang="en-US" dirty="0" err="1" smtClean="0"/>
-              <a:t>casos</a:t>
-            </a:r>
-            <a:r>
-              <a:rPr lang="en-US" dirty="0" smtClean="0"/>
-              <a:t> de </a:t>
-            </a:r>
-            <a:r>
-              <a:rPr lang="en-US" dirty="0" err="1" smtClean="0"/>
-              <a:t>sucesso</a:t>
-            </a:r>
-            <a:endParaRPr lang="pt-BR" dirty="0"/>
-          </a:p>
-        </p:txBody>
-      </p:sp>
-      <p:sp>
-        <p:nvSpPr>
-          <p:cNvPr id="3" name="Content Placeholder 2"/>
+              <a:t>Aplicações</a:t>
+            </a:r>
+            <a:endParaRPr lang="en-US" dirty="0"/>
+          </a:p>
+        </p:txBody>
+      </p:sp>
+      <p:sp>
+        <p:nvSpPr>
+          <p:cNvPr id="3" name="Espaço Reservado para Conteúdo 2"/>
           <p:cNvSpPr>
             <a:spLocks noGrp="1"/>
           </p:cNvSpPr>
@@ -11073,233 +11078,70 @@
             <p:ph idx="1"/>
           </p:nvPr>
         </p:nvSpPr>
-        <p:spPr>
-          <a:xfrm>
-            <a:off x="457200" y="1600200"/>
-            <a:ext cx="8229600" cy="5043510"/>
-          </a:xfrm>
-        </p:spPr>
-        <p:txBody>
-          <a:bodyPr>
-            <a:normAutofit/>
-          </a:bodyPr>
-          <a:lstStyle/>
-          <a:p>
-            <a:r>
-              <a:rPr lang="pt-BR" dirty="0" err="1" smtClean="0">
-                <a:solidFill>
-                  <a:schemeClr val="bg1">
-                    <a:lumMod val="75000"/>
-                  </a:schemeClr>
-                </a:solidFill>
-              </a:rPr>
-              <a:t>Coverity</a:t>
-            </a:r>
-            <a:r>
-              <a:rPr lang="pt-BR" dirty="0" smtClean="0">
-                <a:solidFill>
-                  <a:schemeClr val="bg1">
-                    <a:lumMod val="75000"/>
-                  </a:schemeClr>
-                </a:solidFill>
-              </a:rPr>
-              <a:t>: http://www.coverity.com</a:t>
-            </a:r>
-          </a:p>
-          <a:p>
-            <a:r>
-              <a:rPr lang="en-US" dirty="0" err="1" smtClean="0">
-                <a:solidFill>
-                  <a:schemeClr val="bg1">
-                    <a:lumMod val="75000"/>
-                  </a:schemeClr>
-                </a:solidFill>
-              </a:rPr>
-              <a:t>GrammaTech</a:t>
-            </a:r>
-            <a:r>
-              <a:rPr lang="en-US" dirty="0" smtClean="0">
-                <a:solidFill>
-                  <a:schemeClr val="bg1">
-                    <a:lumMod val="75000"/>
-                  </a:schemeClr>
-                </a:solidFill>
-              </a:rPr>
-              <a:t>: http://www.grammatech.com</a:t>
-            </a:r>
-          </a:p>
-          <a:p>
-            <a:r>
-              <a:rPr lang="en-US" dirty="0" err="1" smtClean="0">
-                <a:solidFill>
-                  <a:schemeClr val="bg1">
-                    <a:lumMod val="75000"/>
-                  </a:schemeClr>
-                </a:solidFill>
-              </a:rPr>
-              <a:t>KlocWork</a:t>
-            </a:r>
-            <a:r>
-              <a:rPr lang="en-US" dirty="0" smtClean="0">
-                <a:solidFill>
-                  <a:schemeClr val="bg1">
-                    <a:lumMod val="75000"/>
-                  </a:schemeClr>
-                </a:solidFill>
-              </a:rPr>
-              <a:t>: http://www.klocwork.com</a:t>
-            </a:r>
-          </a:p>
-          <a:p>
-            <a:r>
-              <a:rPr lang="en-US" dirty="0" err="1" smtClean="0">
-                <a:solidFill>
-                  <a:schemeClr val="bg1">
-                    <a:lumMod val="75000"/>
-                  </a:schemeClr>
-                </a:solidFill>
-              </a:rPr>
-              <a:t>Parasoft</a:t>
-            </a:r>
-            <a:r>
-              <a:rPr lang="en-US" dirty="0" smtClean="0">
-                <a:solidFill>
-                  <a:schemeClr val="bg1">
-                    <a:lumMod val="75000"/>
-                  </a:schemeClr>
-                </a:solidFill>
-              </a:rPr>
-              <a:t>: http://www.parasoft.com</a:t>
-            </a:r>
-          </a:p>
-          <a:p>
-            <a:r>
-              <a:rPr lang="en-US" dirty="0" err="1" smtClean="0">
-                <a:solidFill>
-                  <a:schemeClr val="bg1">
-                    <a:lumMod val="75000"/>
-                  </a:schemeClr>
-                </a:solidFill>
-              </a:rPr>
-              <a:t>Semmle</a:t>
-            </a:r>
-            <a:r>
-              <a:rPr lang="en-US" dirty="0" smtClean="0">
-                <a:solidFill>
-                  <a:schemeClr val="bg1">
-                    <a:lumMod val="75000"/>
-                  </a:schemeClr>
-                </a:solidFill>
-              </a:rPr>
-              <a:t>: http://semmle.com</a:t>
-            </a:r>
-          </a:p>
-          <a:p>
-            <a:r>
-              <a:rPr lang="en-US" dirty="0" smtClean="0">
-                <a:solidFill>
-                  <a:schemeClr val="bg1">
-                    <a:lumMod val="75000"/>
-                  </a:schemeClr>
-                </a:solidFill>
-              </a:rPr>
-              <a:t>…</a:t>
-            </a:r>
-          </a:p>
-          <a:p>
-            <a:pPr lvl="1"/>
-            <a:endParaRPr lang="en-US" dirty="0" smtClean="0"/>
-          </a:p>
-          <a:p>
-            <a:pPr lvl="1"/>
-            <a:endParaRPr lang="en-US" dirty="0" smtClean="0"/>
-          </a:p>
-          <a:p>
-            <a:pPr lvl="1"/>
-            <a:endParaRPr lang="en-US" dirty="0" smtClean="0"/>
-          </a:p>
-          <a:p>
-            <a:pPr lvl="1"/>
-            <a:endParaRPr lang="pt-BR" dirty="0"/>
-          </a:p>
-        </p:txBody>
-      </p:sp>
-      <p:sp>
-        <p:nvSpPr>
-          <p:cNvPr id="4" name="CaixaDeTexto 3"/>
-          <p:cNvSpPr txBox="1"/>
-          <p:nvPr/>
-        </p:nvSpPr>
-        <p:spPr>
-          <a:xfrm>
-            <a:off x="1600200" y="5105400"/>
-            <a:ext cx="6442469" cy="1569660"/>
-          </a:xfrm>
-          <a:prstGeom prst="rect">
-            <a:avLst/>
-          </a:prstGeom>
-          <a:noFill/>
-        </p:spPr>
-        <p:txBody>
-          <a:bodyPr wrap="none" rtlCol="0">
-            <a:spAutoFit/>
-          </a:bodyPr>
-          <a:lstStyle/>
-          <a:p>
-            <a:r>
-              <a:rPr lang="pt-BR" sz="3200" dirty="0" smtClean="0"/>
-              <a:t>Dois Casos: </a:t>
-            </a:r>
-          </a:p>
-          <a:p>
-            <a:r>
-              <a:rPr lang="pt-BR" sz="3200" dirty="0"/>
+        <p:spPr/>
+        <p:txBody>
+          <a:bodyPr/>
+          <a:lstStyle/>
+          <a:p>
+            <a:r>
+              <a:rPr lang="pt-BR" dirty="0"/>
+              <a:t>Análise </a:t>
+            </a:r>
+            <a:r>
+              <a:rPr lang="pt-BR" dirty="0" err="1"/>
+              <a:t>Interprocedural</a:t>
+            </a:r>
+            <a:r>
+              <a:rPr lang="pt-BR" dirty="0"/>
+              <a:t> com RW </a:t>
+            </a:r>
+            <a:r>
+              <a:rPr lang="pt-BR" dirty="0" smtClean="0"/>
+              <a:t>Sets</a:t>
+            </a:r>
+          </a:p>
+          <a:p>
+            <a:r>
+              <a:rPr lang="pt-BR" dirty="0" err="1" smtClean="0"/>
+              <a:t>Slicing</a:t>
+            </a:r>
+            <a:endParaRPr lang="pt-BR" dirty="0" smtClean="0"/>
+          </a:p>
+          <a:p>
+            <a:r>
+              <a:rPr lang="pt-BR" dirty="0" err="1" smtClean="0"/>
+              <a:t>Program</a:t>
+            </a:r>
+            <a:r>
+              <a:rPr lang="pt-BR" dirty="0"/>
               <a:t> </a:t>
             </a:r>
             <a:r>
-              <a:rPr lang="pt-BR" sz="3200" dirty="0" smtClean="0"/>
-              <a:t>Análise </a:t>
-            </a:r>
-            <a:r>
-              <a:rPr lang="pt-BR" sz="3200" dirty="0" err="1" smtClean="0"/>
-              <a:t>Interprocedural</a:t>
-            </a:r>
-            <a:r>
-              <a:rPr lang="pt-BR" sz="3200" dirty="0" smtClean="0"/>
-              <a:t> com RW Sets</a:t>
-            </a:r>
-            <a:endParaRPr lang="pt-BR" sz="3200" dirty="0"/>
-          </a:p>
-          <a:p>
-            <a:r>
-              <a:rPr lang="pt-BR" sz="3200" dirty="0" smtClean="0"/>
+              <a:rPr lang="pt-BR" dirty="0" err="1" smtClean="0"/>
+              <a:t>Model</a:t>
+            </a:r>
+            <a:r>
+              <a:rPr lang="pt-BR" dirty="0" smtClean="0"/>
               <a:t> </a:t>
             </a:r>
             <a:r>
-              <a:rPr lang="pt-BR" sz="3200" dirty="0" err="1" smtClean="0"/>
-              <a:t>Slicing</a:t>
-            </a:r>
-            <a:endParaRPr lang="en-US" sz="3200" dirty="0"/>
+              <a:rPr lang="pt-BR" dirty="0" err="1" smtClean="0"/>
+              <a:t>Checking</a:t>
+            </a:r>
+            <a:endParaRPr lang="en-US" dirty="0"/>
           </a:p>
         </p:txBody>
       </p:sp>
     </p:spTree>
     <p:extLst>
       <p:ext uri="{BB962C8B-B14F-4D97-AF65-F5344CB8AC3E}">
-        <p14:creationId xmlns:p14="http://schemas.microsoft.com/office/powerpoint/2010/main" val="872695881"/>
+        <p14:creationId xmlns:p14="http://schemas.microsoft.com/office/powerpoint/2010/main" val="1584961023"/>
       </p:ext>
     </p:extLst>
   </p:cSld>
   <p:clrMapOvr>
     <a:masterClrMapping/>
   </p:clrMapOvr>
-  <p:timing>
-    <p:tnLst>
-      <p:par>
-        <p:cTn id="1" dur="indefinite" restart="never" nodeType="tmRoot"/>
-      </p:par>
-    </p:tnLst>
-  </p:timing>
 </p:sld>
 </file>
 
@@ -15710,7 +15552,23 @@
             </a:r>
             <a:r>
               <a:rPr lang="en-US" dirty="0" smtClean="0"/>
-              <a:t> com Reads-writes set (RWSETS)</a:t>
+              <a:t> com </a:t>
+            </a:r>
+            <a:r>
+              <a:rPr lang="en-US" dirty="0" smtClean="0"/>
+              <a:t>Read-write </a:t>
+            </a:r>
+            <a:r>
+              <a:rPr lang="en-US" dirty="0" err="1" smtClean="0"/>
+              <a:t>setS</a:t>
+            </a:r>
+            <a:r>
+              <a:rPr lang="en-US" dirty="0" smtClean="0"/>
+              <a:t> </a:t>
+            </a:r>
+            <a:r>
+              <a:rPr lang="en-US" dirty="0" smtClean="0"/>
+              <a:t>(RWSETS)</a:t>
             </a:r>
             <a:endParaRPr lang="en-US" dirty="0"/>
           </a:p>
@@ -19284,7 +19142,7 @@
             </a:r>
             <a:r>
               <a:rPr lang="pt-BR" dirty="0" err="1" smtClean="0"/>
-              <a:t>slicing</a:t>
+              <a:t>Slicing</a:t>
             </a:r>
             <a:endParaRPr lang="en-US" dirty="0"/>
           </a:p>
@@ -19403,7 +19261,11 @@
             </a:r>
             <a:r>
               <a:rPr lang="pt-BR" dirty="0" smtClean="0"/>
-              <a:t>-Write (RW) sets</a:t>
+              <a:t>-Write (RW) </a:t>
+            </a:r>
+            <a:r>
+              <a:rPr lang="pt-BR" dirty="0" smtClean="0"/>
+              <a:t>Sets</a:t>
             </a:r>
             <a:endParaRPr lang="en-US" dirty="0"/>
           </a:p>
@@ -21335,15 +21197,7 @@
           <a:p>
             <a:r>
               <a:rPr lang="pt-BR" sz="2800" dirty="0" smtClean="0"/>
-              <a:t>Encapsulamento de dados pode ser um </a:t>
-            </a:r>
-            <a:r>
-              <a:rPr lang="pt-BR" sz="2800" dirty="0" smtClean="0"/>
-              <a:t>problema. Sensibilidade </a:t>
-            </a:r>
-            <a:r>
-              <a:rPr lang="pt-BR" sz="2800" dirty="0" smtClean="0"/>
-              <a:t>a objetos/ponteiros depende da representação de acesso.  </a:t>
+              <a:t>Encapsulamento de dados pode ser um problema. Sensibilidade a objetos/ponteiros depende da representação de acesso.  </a:t>
             </a:r>
             <a:endParaRPr lang="en-US" sz="2800" dirty="0">
               <a:latin typeface="Courier New" panose="02070309020205020404" pitchFamily="49" charset="0"/>

</xml_diff>